<commit_message>
rework chapters names + some transitions
</commit_message>
<xml_diff>
--- a/images/beautify/css-block-box.pptx
+++ b/images/beautify/css-block-box.pptx
@@ -104,6 +104,11 @@
       </a:defRPr>
     </a:lvl9pPr>
   </p:defaultTextStyle>
+  <p:extLst>
+    <p:ext uri="{EFAFB233-063F-42B5-8137-9DF3F51BA10A}">
+      <p15:sldGuideLst xmlns:p15="http://schemas.microsoft.com/office/powerpoint/2012/main"/>
+    </p:ext>
+  </p:extLst>
 </p:presentation>
 </file>
 
@@ -256,7 +261,7 @@
           <a:p>
             <a:fld id="{CD665B49-7E24-1442-91D4-A07B05217B85}" type="datetimeFigureOut">
               <a:rPr lang="en-CH" smtClean="0"/>
-              <a:t>02.11.20</a:t>
+              <a:t>26.09.21</a:t>
             </a:fld>
             <a:endParaRPr lang="en-CH"/>
           </a:p>
@@ -456,7 +461,7 @@
           <a:p>
             <a:fld id="{CD665B49-7E24-1442-91D4-A07B05217B85}" type="datetimeFigureOut">
               <a:rPr lang="en-CH" smtClean="0"/>
-              <a:t>02.11.20</a:t>
+              <a:t>26.09.21</a:t>
             </a:fld>
             <a:endParaRPr lang="en-CH"/>
           </a:p>
@@ -666,7 +671,7 @@
           <a:p>
             <a:fld id="{CD665B49-7E24-1442-91D4-A07B05217B85}" type="datetimeFigureOut">
               <a:rPr lang="en-CH" smtClean="0"/>
-              <a:t>02.11.20</a:t>
+              <a:t>26.09.21</a:t>
             </a:fld>
             <a:endParaRPr lang="en-CH"/>
           </a:p>
@@ -866,7 +871,7 @@
           <a:p>
             <a:fld id="{CD665B49-7E24-1442-91D4-A07B05217B85}" type="datetimeFigureOut">
               <a:rPr lang="en-CH" smtClean="0"/>
-              <a:t>02.11.20</a:t>
+              <a:t>26.09.21</a:t>
             </a:fld>
             <a:endParaRPr lang="en-CH"/>
           </a:p>
@@ -1142,7 +1147,7 @@
           <a:p>
             <a:fld id="{CD665B49-7E24-1442-91D4-A07B05217B85}" type="datetimeFigureOut">
               <a:rPr lang="en-CH" smtClean="0"/>
-              <a:t>02.11.20</a:t>
+              <a:t>26.09.21</a:t>
             </a:fld>
             <a:endParaRPr lang="en-CH"/>
           </a:p>
@@ -1410,7 +1415,7 @@
           <a:p>
             <a:fld id="{CD665B49-7E24-1442-91D4-A07B05217B85}" type="datetimeFigureOut">
               <a:rPr lang="en-CH" smtClean="0"/>
-              <a:t>02.11.20</a:t>
+              <a:t>26.09.21</a:t>
             </a:fld>
             <a:endParaRPr lang="en-CH"/>
           </a:p>
@@ -1825,7 +1830,7 @@
           <a:p>
             <a:fld id="{CD665B49-7E24-1442-91D4-A07B05217B85}" type="datetimeFigureOut">
               <a:rPr lang="en-CH" smtClean="0"/>
-              <a:t>02.11.20</a:t>
+              <a:t>26.09.21</a:t>
             </a:fld>
             <a:endParaRPr lang="en-CH"/>
           </a:p>
@@ -1967,7 +1972,7 @@
           <a:p>
             <a:fld id="{CD665B49-7E24-1442-91D4-A07B05217B85}" type="datetimeFigureOut">
               <a:rPr lang="en-CH" smtClean="0"/>
-              <a:t>02.11.20</a:t>
+              <a:t>26.09.21</a:t>
             </a:fld>
             <a:endParaRPr lang="en-CH"/>
           </a:p>
@@ -2080,7 +2085,7 @@
           <a:p>
             <a:fld id="{CD665B49-7E24-1442-91D4-A07B05217B85}" type="datetimeFigureOut">
               <a:rPr lang="en-CH" smtClean="0"/>
-              <a:t>02.11.20</a:t>
+              <a:t>26.09.21</a:t>
             </a:fld>
             <a:endParaRPr lang="en-CH"/>
           </a:p>
@@ -2393,7 +2398,7 @@
           <a:p>
             <a:fld id="{CD665B49-7E24-1442-91D4-A07B05217B85}" type="datetimeFigureOut">
               <a:rPr lang="en-CH" smtClean="0"/>
-              <a:t>02.11.20</a:t>
+              <a:t>26.09.21</a:t>
             </a:fld>
             <a:endParaRPr lang="en-CH"/>
           </a:p>
@@ -2682,7 +2687,7 @@
           <a:p>
             <a:fld id="{CD665B49-7E24-1442-91D4-A07B05217B85}" type="datetimeFigureOut">
               <a:rPr lang="en-CH" smtClean="0"/>
-              <a:t>02.11.20</a:t>
+              <a:t>26.09.21</a:t>
             </a:fld>
             <a:endParaRPr lang="en-CH"/>
           </a:p>
@@ -2925,7 +2930,7 @@
           <a:p>
             <a:fld id="{CD665B49-7E24-1442-91D4-A07B05217B85}" type="datetimeFigureOut">
               <a:rPr lang="en-CH" smtClean="0"/>
-              <a:t>02.11.20</a:t>
+              <a:t>26.09.21</a:t>
             </a:fld>
             <a:endParaRPr lang="en-CH"/>
           </a:p>
@@ -4573,6 +4578,129 @@
           </a:p>
         </p:txBody>
       </p:sp>
+      <p:cxnSp>
+        <p:nvCxnSpPr>
+          <p:cNvPr id="3" name="Straight Arrow Connector 2">
+            <a:extLst>
+              <a:ext uri="{FF2B5EF4-FFF2-40B4-BE49-F238E27FC236}">
+                <a16:creationId xmlns:a16="http://schemas.microsoft.com/office/drawing/2014/main" id="{9C72519C-512F-D448-A9DC-B9F3BEAE0701}"/>
+              </a:ext>
+            </a:extLst>
+          </p:cNvPr>
+          <p:cNvCxnSpPr>
+            <a:cxnSpLocks/>
+          </p:cNvCxnSpPr>
+          <p:nvPr/>
+        </p:nvCxnSpPr>
+        <p:spPr>
+          <a:xfrm flipH="1" flipV="1">
+            <a:off x="6808424" y="4375158"/>
+            <a:ext cx="457692" cy="385426"/>
+          </a:xfrm>
+          <a:prstGeom prst="straightConnector1">
+            <a:avLst/>
+          </a:prstGeom>
+          <a:ln w="25400">
+            <a:solidFill>
+              <a:schemeClr val="tx1"/>
+            </a:solidFill>
+            <a:tailEnd type="triangle"/>
+          </a:ln>
+        </p:spPr>
+        <p:style>
+          <a:lnRef idx="1">
+            <a:schemeClr val="accent1"/>
+          </a:lnRef>
+          <a:fillRef idx="0">
+            <a:schemeClr val="accent1"/>
+          </a:fillRef>
+          <a:effectRef idx="0">
+            <a:schemeClr val="accent1"/>
+          </a:effectRef>
+          <a:fontRef idx="minor">
+            <a:schemeClr val="tx1"/>
+          </a:fontRef>
+        </p:style>
+      </p:cxnSp>
+      <p:sp>
+        <p:nvSpPr>
+          <p:cNvPr id="6" name="TextBox 5">
+            <a:extLst>
+              <a:ext uri="{FF2B5EF4-FFF2-40B4-BE49-F238E27FC236}">
+                <a16:creationId xmlns:a16="http://schemas.microsoft.com/office/drawing/2014/main" id="{68652E70-B00A-0B45-8E1D-2FF85A6CD852}"/>
+              </a:ext>
+            </a:extLst>
+          </p:cNvPr>
+          <p:cNvSpPr txBox="1"/>
+          <p:nvPr/>
+        </p:nvSpPr>
+        <p:spPr>
+          <a:xfrm>
+            <a:off x="7296839" y="4604802"/>
+            <a:ext cx="822726" cy="369332"/>
+          </a:xfrm>
+          <a:prstGeom prst="rect">
+            <a:avLst/>
+          </a:prstGeom>
+          <a:noFill/>
+        </p:spPr>
+        <p:txBody>
+          <a:bodyPr wrap="none" rtlCol="0">
+            <a:spAutoFit/>
+          </a:bodyPr>
+          <a:lstStyle/>
+          <a:p>
+            <a:r>
+              <a:rPr lang="en-CH" dirty="0"/>
+              <a:t>border</a:t>
+            </a:r>
+          </a:p>
+        </p:txBody>
+      </p:sp>
+      <p:cxnSp>
+        <p:nvCxnSpPr>
+          <p:cNvPr id="42" name="Straight Arrow Connector 41">
+            <a:extLst>
+              <a:ext uri="{FF2B5EF4-FFF2-40B4-BE49-F238E27FC236}">
+                <a16:creationId xmlns:a16="http://schemas.microsoft.com/office/drawing/2014/main" id="{6E979F5F-C4C3-3A43-8BB5-157DBFFB0ACB}"/>
+              </a:ext>
+            </a:extLst>
+          </p:cNvPr>
+          <p:cNvCxnSpPr>
+            <a:cxnSpLocks/>
+          </p:cNvCxnSpPr>
+          <p:nvPr/>
+        </p:nvCxnSpPr>
+        <p:spPr>
+          <a:xfrm flipH="1">
+            <a:off x="6852674" y="4763886"/>
+            <a:ext cx="413442" cy="339661"/>
+          </a:xfrm>
+          <a:prstGeom prst="straightConnector1">
+            <a:avLst/>
+          </a:prstGeom>
+          <a:ln w="25400">
+            <a:solidFill>
+              <a:schemeClr val="tx1"/>
+            </a:solidFill>
+            <a:tailEnd type="triangle"/>
+          </a:ln>
+        </p:spPr>
+        <p:style>
+          <a:lnRef idx="1">
+            <a:schemeClr val="accent1"/>
+          </a:lnRef>
+          <a:fillRef idx="0">
+            <a:schemeClr val="accent1"/>
+          </a:fillRef>
+          <a:effectRef idx="0">
+            <a:schemeClr val="accent1"/>
+          </a:effectRef>
+          <a:fontRef idx="minor">
+            <a:schemeClr val="tx1"/>
+          </a:fontRef>
+        </p:style>
+      </p:cxnSp>
     </p:spTree>
     <p:extLst>
       <p:ext uri="{BB962C8B-B14F-4D97-AF65-F5344CB8AC3E}">

</xml_diff>